<commit_message>
kamera in flur gelöscht
</commit_message>
<xml_diff>
--- a/Docs/Das fremde Ich Sprint3.pptx
+++ b/Docs/Das fremde Ich Sprint3.pptx
@@ -7,13 +7,14 @@
   <p:sldIdLst>
     <p:sldId id="256" r:id="rId2"/>
     <p:sldId id="257" r:id="rId3"/>
-    <p:sldId id="264" r:id="rId4"/>
-    <p:sldId id="263" r:id="rId5"/>
-    <p:sldId id="259" r:id="rId6"/>
-    <p:sldId id="261" r:id="rId7"/>
-    <p:sldId id="258" r:id="rId8"/>
-    <p:sldId id="262" r:id="rId9"/>
-    <p:sldId id="260" r:id="rId10"/>
+    <p:sldId id="263" r:id="rId4"/>
+    <p:sldId id="259" r:id="rId5"/>
+    <p:sldId id="261" r:id="rId6"/>
+    <p:sldId id="258" r:id="rId7"/>
+    <p:sldId id="262" r:id="rId8"/>
+    <p:sldId id="264" r:id="rId9"/>
+    <p:sldId id="265" r:id="rId10"/>
+    <p:sldId id="260" r:id="rId11"/>
   </p:sldIdLst>
   <p:sldSz cx="12192000" cy="6858000"/>
   <p:notesSz cx="6858000" cy="9144000"/>
@@ -114,7 +115,18 @@
   </p:defaultTextStyle>
   <p:extLst>
     <p:ext uri="{EFAFB233-063F-42B5-8137-9DF3F51BA10A}">
-      <p15:sldGuideLst xmlns:p15="http://schemas.microsoft.com/office/powerpoint/2012/main" xmlns=""/>
+      <p15:sldGuideLst xmlns:p15="http://schemas.microsoft.com/office/powerpoint/2012/main">
+        <p15:guide id="1" orient="horz" pos="2160">
+          <p15:clr>
+            <a:srgbClr val="A4A3A4"/>
+          </p15:clr>
+        </p15:guide>
+        <p15:guide id="2" pos="3840">
+          <p15:clr>
+            <a:srgbClr val="A4A3A4"/>
+          </p15:clr>
+        </p15:guide>
+      </p15:sldGuideLst>
     </p:ext>
   </p:extLst>
 </p:presentation>
@@ -680,7 +692,7 @@
     </p:spTree>
     <p:extLst>
       <p:ext uri="{BB962C8B-B14F-4D97-AF65-F5344CB8AC3E}">
-        <p14:creationId xmlns:p14="http://schemas.microsoft.com/office/powerpoint/2010/main" xmlns="" val="1106275403"/>
+        <p14:creationId xmlns:p14="http://schemas.microsoft.com/office/powerpoint/2010/main" val="1106275403"/>
       </p:ext>
     </p:extLst>
   </p:cSld>
@@ -973,7 +985,7 @@
     </p:spTree>
     <p:extLst>
       <p:ext uri="{BB962C8B-B14F-4D97-AF65-F5344CB8AC3E}">
-        <p14:creationId xmlns:p14="http://schemas.microsoft.com/office/powerpoint/2010/main" xmlns="" val="2198889774"/>
+        <p14:creationId xmlns:p14="http://schemas.microsoft.com/office/powerpoint/2010/main" val="2198889774"/>
       </p:ext>
     </p:extLst>
   </p:cSld>
@@ -1223,7 +1235,7 @@
     </p:spTree>
     <p:extLst>
       <p:ext uri="{BB962C8B-B14F-4D97-AF65-F5344CB8AC3E}">
-        <p14:creationId xmlns:p14="http://schemas.microsoft.com/office/powerpoint/2010/main" xmlns="" val="145337046"/>
+        <p14:creationId xmlns:p14="http://schemas.microsoft.com/office/powerpoint/2010/main" val="145337046"/>
       </p:ext>
     </p:extLst>
   </p:cSld>
@@ -1765,7 +1777,7 @@
     </p:spTree>
     <p:extLst>
       <p:ext uri="{BB962C8B-B14F-4D97-AF65-F5344CB8AC3E}">
-        <p14:creationId xmlns:p14="http://schemas.microsoft.com/office/powerpoint/2010/main" xmlns="" val="1926426252"/>
+        <p14:creationId xmlns:p14="http://schemas.microsoft.com/office/powerpoint/2010/main" val="1926426252"/>
       </p:ext>
     </p:extLst>
   </p:cSld>
@@ -2015,7 +2027,7 @@
     </p:spTree>
     <p:extLst>
       <p:ext uri="{BB962C8B-B14F-4D97-AF65-F5344CB8AC3E}">
-        <p14:creationId xmlns:p14="http://schemas.microsoft.com/office/powerpoint/2010/main" xmlns="" val="1121562696"/>
+        <p14:creationId xmlns:p14="http://schemas.microsoft.com/office/powerpoint/2010/main" val="1121562696"/>
       </p:ext>
     </p:extLst>
   </p:cSld>
@@ -2549,7 +2561,7 @@
     </p:spTree>
     <p:extLst>
       <p:ext uri="{BB962C8B-B14F-4D97-AF65-F5344CB8AC3E}">
-        <p14:creationId xmlns:p14="http://schemas.microsoft.com/office/powerpoint/2010/main" xmlns="" val="3580841685"/>
+        <p14:creationId xmlns:p14="http://schemas.microsoft.com/office/powerpoint/2010/main" val="3580841685"/>
       </p:ext>
     </p:extLst>
   </p:cSld>
@@ -2848,7 +2860,7 @@
     </p:spTree>
     <p:extLst>
       <p:ext uri="{BB962C8B-B14F-4D97-AF65-F5344CB8AC3E}">
-        <p14:creationId xmlns:p14="http://schemas.microsoft.com/office/powerpoint/2010/main" xmlns="" val="2217559508"/>
+        <p14:creationId xmlns:p14="http://schemas.microsoft.com/office/powerpoint/2010/main" val="2217559508"/>
       </p:ext>
     </p:extLst>
   </p:cSld>
@@ -3024,7 +3036,7 @@
     </p:spTree>
     <p:extLst>
       <p:ext uri="{BB962C8B-B14F-4D97-AF65-F5344CB8AC3E}">
-        <p14:creationId xmlns:p14="http://schemas.microsoft.com/office/powerpoint/2010/main" xmlns="" val="2720507506"/>
+        <p14:creationId xmlns:p14="http://schemas.microsoft.com/office/powerpoint/2010/main" val="2720507506"/>
       </p:ext>
     </p:extLst>
   </p:cSld>
@@ -3206,7 +3218,7 @@
     </p:spTree>
     <p:extLst>
       <p:ext uri="{BB962C8B-B14F-4D97-AF65-F5344CB8AC3E}">
-        <p14:creationId xmlns:p14="http://schemas.microsoft.com/office/powerpoint/2010/main" xmlns="" val="784018468"/>
+        <p14:creationId xmlns:p14="http://schemas.microsoft.com/office/powerpoint/2010/main" val="784018468"/>
       </p:ext>
     </p:extLst>
   </p:cSld>
@@ -3383,7 +3395,7 @@
     </p:spTree>
     <p:extLst>
       <p:ext uri="{BB962C8B-B14F-4D97-AF65-F5344CB8AC3E}">
-        <p14:creationId xmlns:p14="http://schemas.microsoft.com/office/powerpoint/2010/main" xmlns="" val="2609109252"/>
+        <p14:creationId xmlns:p14="http://schemas.microsoft.com/office/powerpoint/2010/main" val="2609109252"/>
       </p:ext>
     </p:extLst>
   </p:cSld>
@@ -3631,7 +3643,7 @@
     </p:spTree>
     <p:extLst>
       <p:ext uri="{BB962C8B-B14F-4D97-AF65-F5344CB8AC3E}">
-        <p14:creationId xmlns:p14="http://schemas.microsoft.com/office/powerpoint/2010/main" xmlns="" val="666607288"/>
+        <p14:creationId xmlns:p14="http://schemas.microsoft.com/office/powerpoint/2010/main" val="666607288"/>
       </p:ext>
     </p:extLst>
   </p:cSld>
@@ -3930,7 +3942,7 @@
     </p:spTree>
     <p:extLst>
       <p:ext uri="{BB962C8B-B14F-4D97-AF65-F5344CB8AC3E}">
-        <p14:creationId xmlns:p14="http://schemas.microsoft.com/office/powerpoint/2010/main" xmlns="" val="1658806526"/>
+        <p14:creationId xmlns:p14="http://schemas.microsoft.com/office/powerpoint/2010/main" val="1658806526"/>
       </p:ext>
     </p:extLst>
   </p:cSld>
@@ -4374,7 +4386,7 @@
     </p:spTree>
     <p:extLst>
       <p:ext uri="{BB962C8B-B14F-4D97-AF65-F5344CB8AC3E}">
-        <p14:creationId xmlns:p14="http://schemas.microsoft.com/office/powerpoint/2010/main" xmlns="" val="2046462902"/>
+        <p14:creationId xmlns:p14="http://schemas.microsoft.com/office/powerpoint/2010/main" val="2046462902"/>
       </p:ext>
     </p:extLst>
   </p:cSld>
@@ -4494,7 +4506,7 @@
     </p:spTree>
     <p:extLst>
       <p:ext uri="{BB962C8B-B14F-4D97-AF65-F5344CB8AC3E}">
-        <p14:creationId xmlns:p14="http://schemas.microsoft.com/office/powerpoint/2010/main" xmlns="" val="278312442"/>
+        <p14:creationId xmlns:p14="http://schemas.microsoft.com/office/powerpoint/2010/main" val="278312442"/>
       </p:ext>
     </p:extLst>
   </p:cSld>
@@ -4591,7 +4603,7 @@
     </p:spTree>
     <p:extLst>
       <p:ext uri="{BB962C8B-B14F-4D97-AF65-F5344CB8AC3E}">
-        <p14:creationId xmlns:p14="http://schemas.microsoft.com/office/powerpoint/2010/main" xmlns="" val="1459784615"/>
+        <p14:creationId xmlns:p14="http://schemas.microsoft.com/office/powerpoint/2010/main" val="1459784615"/>
       </p:ext>
     </p:extLst>
   </p:cSld>
@@ -4876,7 +4888,7 @@
     </p:spTree>
     <p:extLst>
       <p:ext uri="{BB962C8B-B14F-4D97-AF65-F5344CB8AC3E}">
-        <p14:creationId xmlns:p14="http://schemas.microsoft.com/office/powerpoint/2010/main" xmlns="" val="2249473352"/>
+        <p14:creationId xmlns:p14="http://schemas.microsoft.com/office/powerpoint/2010/main" val="2249473352"/>
       </p:ext>
     </p:extLst>
   </p:cSld>
@@ -5169,7 +5181,7 @@
     </p:spTree>
     <p:extLst>
       <p:ext uri="{BB962C8B-B14F-4D97-AF65-F5344CB8AC3E}">
-        <p14:creationId xmlns:p14="http://schemas.microsoft.com/office/powerpoint/2010/main" xmlns="" val="1792355243"/>
+        <p14:creationId xmlns:p14="http://schemas.microsoft.com/office/powerpoint/2010/main" val="1792355243"/>
       </p:ext>
     </p:extLst>
   </p:cSld>
@@ -5737,7 +5749,7 @@
     </p:spTree>
     <p:extLst>
       <p:ext uri="{BB962C8B-B14F-4D97-AF65-F5344CB8AC3E}">
-        <p14:creationId xmlns:p14="http://schemas.microsoft.com/office/powerpoint/2010/main" xmlns="" val="571914135"/>
+        <p14:creationId xmlns:p14="http://schemas.microsoft.com/office/powerpoint/2010/main" val="571914135"/>
       </p:ext>
     </p:extLst>
   </p:cSld>
@@ -6193,7 +6205,7 @@
           <a:blip r:embed="rId2">
             <a:extLst>
               <a:ext uri="{28A0092B-C50C-407E-A947-70E740481C1C}">
-                <a14:useLocalDpi xmlns:a14="http://schemas.microsoft.com/office/drawing/2010/main" xmlns="" val="0"/>
+                <a14:useLocalDpi xmlns:a14="http://schemas.microsoft.com/office/drawing/2010/main" val="0"/>
               </a:ext>
             </a:extLst>
           </a:blip>
@@ -6309,7 +6321,112 @@
     </p:spTree>
     <p:extLst>
       <p:ext uri="{BB962C8B-B14F-4D97-AF65-F5344CB8AC3E}">
-        <p14:creationId xmlns:p14="http://schemas.microsoft.com/office/powerpoint/2010/main" xmlns="" val="2818652683"/>
+        <p14:creationId xmlns:p14="http://schemas.microsoft.com/office/powerpoint/2010/main" val="2818652683"/>
+      </p:ext>
+    </p:extLst>
+  </p:cSld>
+  <p:clrMapOvr>
+    <a:masterClrMapping/>
+  </p:clrMapOvr>
+  <p:timing>
+    <p:tnLst>
+      <p:par>
+        <p:cTn id="1" dur="indefinite" restart="never" nodeType="tmRoot"/>
+      </p:par>
+    </p:tnLst>
+  </p:timing>
+</p:sld>
+</file>
+
+<file path=ppt/slides/slide10.xml><?xml version="1.0" encoding="utf-8"?>
+<p:sld xmlns:a="http://schemas.openxmlformats.org/drawingml/2006/main" xmlns:r="http://schemas.openxmlformats.org/officeDocument/2006/relationships" xmlns:p="http://schemas.openxmlformats.org/presentationml/2006/main">
+  <p:cSld>
+    <p:spTree>
+      <p:nvGrpSpPr>
+        <p:cNvPr id="1" name=""/>
+        <p:cNvGrpSpPr/>
+        <p:nvPr/>
+      </p:nvGrpSpPr>
+      <p:grpSpPr>
+        <a:xfrm>
+          <a:off x="0" y="0"/>
+          <a:ext cx="0" cy="0"/>
+          <a:chOff x="0" y="0"/>
+          <a:chExt cx="0" cy="0"/>
+        </a:xfrm>
+      </p:grpSpPr>
+      <p:sp>
+        <p:nvSpPr>
+          <p:cNvPr id="2" name="Titel 1"/>
+          <p:cNvSpPr>
+            <a:spLocks noGrp="1"/>
+          </p:cNvSpPr>
+          <p:nvPr>
+            <p:ph type="title"/>
+          </p:nvPr>
+        </p:nvSpPr>
+        <p:spPr/>
+        <p:txBody>
+          <a:bodyPr/>
+          <a:lstStyle/>
+          <a:p>
+            <a:r>
+              <a:rPr lang="de-DE" dirty="0" smtClean="0"/>
+              <a:t>Nächste Schritte</a:t>
+            </a:r>
+            <a:endParaRPr lang="de-DE" dirty="0"/>
+          </a:p>
+        </p:txBody>
+      </p:sp>
+      <p:sp>
+        <p:nvSpPr>
+          <p:cNvPr id="3" name="Inhaltsplatzhalter 2"/>
+          <p:cNvSpPr>
+            <a:spLocks noGrp="1"/>
+          </p:cNvSpPr>
+          <p:nvPr>
+            <p:ph idx="1"/>
+          </p:nvPr>
+        </p:nvSpPr>
+        <p:spPr/>
+        <p:txBody>
+          <a:bodyPr/>
+          <a:lstStyle/>
+          <a:p>
+            <a:r>
+              <a:rPr lang="de-DE" dirty="0" smtClean="0"/>
+              <a:t>Materialien ausarbeiten für UV und Röntgen</a:t>
+            </a:r>
+          </a:p>
+          <a:p>
+            <a:r>
+              <a:rPr lang="de-DE" dirty="0" smtClean="0"/>
+              <a:t>Menü/Inventar einbauen</a:t>
+            </a:r>
+          </a:p>
+          <a:p>
+            <a:r>
+              <a:rPr lang="de-DE" dirty="0"/>
+              <a:t>Rätsel </a:t>
+            </a:r>
+            <a:r>
+              <a:rPr lang="de-DE" dirty="0" smtClean="0"/>
+              <a:t>fertigstellen</a:t>
+            </a:r>
+          </a:p>
+          <a:p>
+            <a:r>
+              <a:rPr lang="de-DE" dirty="0" smtClean="0"/>
+              <a:t>Und natürlich alles Weitere…</a:t>
+            </a:r>
+            <a:endParaRPr lang="de-DE" dirty="0" smtClean="0"/>
+          </a:p>
+        </p:txBody>
+      </p:sp>
+    </p:spTree>
+    <p:extLst>
+      <p:ext uri="{BB962C8B-B14F-4D97-AF65-F5344CB8AC3E}">
+        <p14:creationId xmlns:p14="http://schemas.microsoft.com/office/powerpoint/2010/main" val="1854967349"/>
       </p:ext>
     </p:extLst>
   </p:cSld>
@@ -6404,21 +6521,20 @@
           <a:p>
             <a:r>
               <a:rPr lang="de-DE" dirty="0" smtClean="0"/>
-              <a:t>Keller, Wohnzimmer und Küche ausmodelliert</a:t>
-            </a:r>
-          </a:p>
-          <a:p>
+              <a:t>Keller, Wohnzimmer und Küche </a:t>
+            </a:r>
             <a:r>
               <a:rPr lang="de-DE" dirty="0" smtClean="0"/>
-              <a:t>Hebelrätsel im Flur mit Gewinnbenachrichtigung (Screenshot)</a:t>
-            </a:r>
+              <a:t>ausmodelliert</a:t>
+            </a:r>
+            <a:endParaRPr lang="de-DE" dirty="0" smtClean="0"/>
           </a:p>
         </p:txBody>
       </p:sp>
     </p:spTree>
     <p:extLst>
       <p:ext uri="{BB962C8B-B14F-4D97-AF65-F5344CB8AC3E}">
-        <p14:creationId xmlns:p14="http://schemas.microsoft.com/office/powerpoint/2010/main" xmlns="" val="205027957"/>
+        <p14:creationId xmlns:p14="http://schemas.microsoft.com/office/powerpoint/2010/main" val="205027957"/>
       </p:ext>
     </p:extLst>
   </p:cSld>
@@ -6467,6 +6583,10 @@
           <a:bodyPr/>
           <a:lstStyle/>
           <a:p>
+            <a:r>
+              <a:rPr lang="de-DE" dirty="0" smtClean="0"/>
+              <a:t>Fortschritt II - Sounds</a:t>
+            </a:r>
             <a:endParaRPr lang="de-DE" dirty="0"/>
           </a:p>
         </p:txBody>
@@ -6484,44 +6604,68 @@
         <p:spPr/>
         <p:txBody>
           <a:bodyPr>
-            <a:normAutofit/>
+            <a:normAutofit fontScale="92500" lnSpcReduction="20000"/>
           </a:bodyPr>
           <a:lstStyle/>
           <a:p>
+            <a:r>
+              <a:rPr lang="de-DE" dirty="0" smtClean="0"/>
+              <a:t>Ca. Hälfte der Sounds von der Audiogruppe erhalten</a:t>
+            </a:r>
+          </a:p>
+          <a:p>
+            <a:r>
+              <a:rPr lang="de-DE" dirty="0" smtClean="0"/>
+              <a:t> keine Musik -&gt; nochmal Treffen</a:t>
+            </a:r>
+          </a:p>
+          <a:p>
+            <a:pPr marL="0" indent="0">
+              <a:buNone/>
+            </a:pPr>
+            <a:endParaRPr lang="de-DE" dirty="0"/>
+          </a:p>
+          <a:p>
+            <a:pPr marL="0" indent="0">
+              <a:buNone/>
+            </a:pPr>
+            <a:r>
+              <a:rPr lang="de-DE" dirty="0" smtClean="0"/>
+              <a:t>Wassertropfen, Dampf, Holz sägen, Wecker, Kühlschranksurren, Metallschrank auf/zu, Papierrascheln, Scherben aufsammeln,  Schlüssel, verschlossene Schublade , Spieluhr, tickende Uhr, Tür </a:t>
+            </a:r>
+            <a:r>
+              <a:rPr lang="de-DE" dirty="0" smtClean="0"/>
+              <a:t>auf</a:t>
+            </a:r>
+          </a:p>
+          <a:p>
+            <a:pPr marL="0" indent="0">
+              <a:buNone/>
+            </a:pPr>
             <a:endParaRPr lang="de-DE" dirty="0" smtClean="0"/>
           </a:p>
-        </p:txBody>
-      </p:sp>
-      <p:pic>
-        <p:nvPicPr>
-          <p:cNvPr id="2050" name="Picture 2" descr="C:\Users\movement\Documents\MenübildKiZi.png"/>
-          <p:cNvPicPr>
-            <a:picLocks noChangeAspect="1" noChangeArrowheads="1"/>
-          </p:cNvPicPr>
-          <p:nvPr/>
-        </p:nvPicPr>
-        <p:blipFill>
-          <a:blip r:embed="rId2"/>
-          <a:srcRect/>
-          <a:stretch>
-            <a:fillRect/>
-          </a:stretch>
-        </p:blipFill>
-        <p:spPr bwMode="auto">
-          <a:xfrm>
-            <a:off x="0" y="-1"/>
-            <a:ext cx="12192000" cy="6873679"/>
-          </a:xfrm>
-          <a:prstGeom prst="rect">
-            <a:avLst/>
-          </a:prstGeom>
-          <a:noFill/>
-        </p:spPr>
-      </p:pic>
+          <a:p>
+            <a:r>
+              <a:rPr lang="de-DE" dirty="0" smtClean="0"/>
+              <a:t>Sounds teilweise zu lang</a:t>
+            </a:r>
+            <a:endParaRPr lang="de-DE" dirty="0"/>
+          </a:p>
+          <a:p>
+            <a:endParaRPr lang="de-DE" dirty="0" smtClean="0"/>
+          </a:p>
+          <a:p>
+            <a:pPr marL="0" indent="0">
+              <a:buNone/>
+            </a:pPr>
+            <a:endParaRPr lang="de-DE" dirty="0" smtClean="0"/>
+          </a:p>
+        </p:txBody>
+      </p:sp>
     </p:spTree>
     <p:extLst>
       <p:ext uri="{BB962C8B-B14F-4D97-AF65-F5344CB8AC3E}">
-        <p14:creationId xmlns:p14="http://schemas.microsoft.com/office/powerpoint/2010/main" xmlns="" val="205027957"/>
+        <p14:creationId xmlns:p14="http://schemas.microsoft.com/office/powerpoint/2010/main" val="1729995297"/>
       </p:ext>
     </p:extLst>
   </p:cSld>
@@ -6572,7 +6716,7 @@
           <a:p>
             <a:r>
               <a:rPr lang="de-DE" dirty="0" smtClean="0"/>
-              <a:t>Fortschritt II - Sounds</a:t>
+              <a:t>Änderungen I</a:t>
             </a:r>
             <a:endParaRPr lang="de-DE" dirty="0"/>
           </a:p>
@@ -6590,20 +6734,71 @@
         </p:nvSpPr>
         <p:spPr/>
         <p:txBody>
-          <a:bodyPr>
-            <a:normAutofit lnSpcReduction="10000"/>
-          </a:bodyPr>
-          <a:lstStyle/>
-          <a:p>
+          <a:bodyPr/>
+          <a:lstStyle/>
+          <a:p>
+            <a:pPr marL="0" indent="0">
+              <a:buNone/>
+            </a:pPr>
+            <a:r>
+              <a:rPr lang="de-DE" b="1" dirty="0" smtClean="0"/>
+              <a:t>Vorher: </a:t>
+            </a:r>
             <a:r>
               <a:rPr lang="de-DE" dirty="0" smtClean="0"/>
-              <a:t>Ca. Hälfte der Sounds von der Audiogruppe erhalten</a:t>
-            </a:r>
-          </a:p>
-          <a:p>
+              <a:t>mehrere Kameras in einem Raum, Umschalten für verschiedene Perspektiven</a:t>
+            </a:r>
+          </a:p>
+          <a:p>
+            <a:pPr marL="0" indent="0">
+              <a:buNone/>
+            </a:pPr>
+            <a:r>
+              <a:rPr lang="de-DE" b="1" dirty="0" smtClean="0"/>
+              <a:t>Nachher: </a:t>
+            </a:r>
             <a:r>
               <a:rPr lang="de-DE" dirty="0" smtClean="0"/>
-              <a:t> keine Musik -&gt; nochmal Treffen</a:t>
+              <a:t>Nur eine Kamera (main-</a:t>
+            </a:r>
+            <a:r>
+              <a:rPr lang="de-DE" dirty="0" err="1" smtClean="0"/>
+              <a:t>camera</a:t>
+            </a:r>
+            <a:r>
+              <a:rPr lang="de-DE" dirty="0" smtClean="0"/>
+              <a:t>), deren Position mittels Script verändert wird</a:t>
+            </a:r>
+          </a:p>
+          <a:p>
+            <a:pPr marL="0" indent="0">
+              <a:buNone/>
+            </a:pPr>
+            <a:r>
+              <a:rPr lang="de-DE" b="1" dirty="0" smtClean="0"/>
+              <a:t>Grund: </a:t>
+            </a:r>
+            <a:r>
+              <a:rPr lang="de-DE" dirty="0" smtClean="0"/>
+              <a:t>einfacher für </a:t>
+            </a:r>
+            <a:r>
+              <a:rPr lang="de-DE" dirty="0" err="1" smtClean="0"/>
+              <a:t>Eyetracker</a:t>
+            </a:r>
+            <a:endParaRPr lang="de-DE" dirty="0" smtClean="0"/>
+          </a:p>
+          <a:p>
+            <a:pPr marL="0" indent="0">
+              <a:buNone/>
+            </a:pPr>
+            <a:r>
+              <a:rPr lang="de-DE" dirty="0" smtClean="0"/>
+              <a:t>Umschalten </a:t>
+            </a:r>
+            <a:r>
+              <a:rPr lang="de-DE" dirty="0"/>
+              <a:t>mit Tasten 1,2,3.. wird vorerst beibehalten</a:t>
             </a:r>
           </a:p>
           <a:p>
@@ -6611,38 +6806,13 @@
               <a:buNone/>
             </a:pPr>
             <a:endParaRPr lang="de-DE" dirty="0"/>
-          </a:p>
-          <a:p>
-            <a:pPr marL="0" indent="0">
-              <a:buNone/>
-            </a:pPr>
-            <a:r>
-              <a:rPr lang="de-DE" dirty="0" smtClean="0"/>
-              <a:t>Wassertropfen, Dampf, Holz sägen, Wecker, Kühlschranksurren, Metallschrank auf/zu, Papierrascheln, Scherben aufsammeln,  Schlüssel, verschlossene Schublade , Spieluhr, tickende Uhr, Tür auf</a:t>
-            </a:r>
-          </a:p>
-          <a:p>
-            <a:r>
-              <a:rPr lang="de-DE" dirty="0" smtClean="0"/>
-              <a:t>Sounds teilweise zu lang</a:t>
-            </a:r>
-            <a:endParaRPr lang="de-DE" dirty="0"/>
-          </a:p>
-          <a:p>
-            <a:endParaRPr lang="de-DE" dirty="0" smtClean="0"/>
-          </a:p>
-          <a:p>
-            <a:pPr marL="0" indent="0">
-              <a:buNone/>
-            </a:pPr>
-            <a:endParaRPr lang="de-DE" dirty="0" smtClean="0"/>
           </a:p>
         </p:txBody>
       </p:sp>
     </p:spTree>
     <p:extLst>
       <p:ext uri="{BB962C8B-B14F-4D97-AF65-F5344CB8AC3E}">
-        <p14:creationId xmlns:p14="http://schemas.microsoft.com/office/powerpoint/2010/main" xmlns="" val="1729995297"/>
+        <p14:creationId xmlns:p14="http://schemas.microsoft.com/office/powerpoint/2010/main" val="2149821311"/>
       </p:ext>
     </p:extLst>
   </p:cSld>
@@ -6693,7 +6863,7 @@
           <a:p>
             <a:r>
               <a:rPr lang="de-DE" dirty="0" smtClean="0"/>
-              <a:t>Änderungen I</a:t>
+              <a:t>Änderungen II</a:t>
             </a:r>
             <a:endParaRPr lang="de-DE" dirty="0"/>
           </a:p>
@@ -6723,7 +6893,7 @@
             </a:r>
             <a:r>
               <a:rPr lang="de-DE" dirty="0" smtClean="0"/>
-              <a:t>mehrere Kameras in einem Raum, Umschalten für verschiedene Perspektiven</a:t>
+              <a:t>Nur die benötigten Modi in einzelnen Räumen vorhanden (z.B. Keller: nur Taschenlampe)</a:t>
             </a:r>
           </a:p>
           <a:p>
@@ -6736,15 +6906,15 @@
             </a:r>
             <a:r>
               <a:rPr lang="de-DE" dirty="0" smtClean="0"/>
-              <a:t>Nur eine Kamera (main-</a:t>
-            </a:r>
-            <a:r>
-              <a:rPr lang="de-DE" dirty="0" err="1" smtClean="0"/>
-              <a:t>camera</a:t>
+              <a:t>Alle Modi </a:t>
+            </a:r>
+            <a:r>
+              <a:rPr lang="de-DE" dirty="0"/>
+              <a:t>ü</a:t>
             </a:r>
             <a:r>
               <a:rPr lang="de-DE" dirty="0" smtClean="0"/>
-              <a:t>), deren Position mittels Script verändert wird</a:t>
+              <a:t>berall verwendbar, aber nicht immer benötigt (Keller: Taschenlampe, UV, Röntgen)</a:t>
             </a:r>
           </a:p>
           <a:p>
@@ -6757,31 +6927,8 @@
             </a:r>
             <a:r>
               <a:rPr lang="de-DE" dirty="0" smtClean="0"/>
-              <a:t>einfacher für </a:t>
-            </a:r>
-            <a:r>
-              <a:rPr lang="de-DE" dirty="0" err="1" smtClean="0"/>
-              <a:t>Eyetracker</a:t>
-            </a:r>
-            <a:endParaRPr lang="de-DE" dirty="0" smtClean="0"/>
-          </a:p>
-          <a:p>
-            <a:pPr marL="0" indent="0">
-              <a:buNone/>
-            </a:pPr>
-            <a:r>
-              <a:rPr lang="de-DE" dirty="0" smtClean="0"/>
-              <a:t>Umschalten </a:t>
-            </a:r>
-            <a:r>
-              <a:rPr lang="de-DE" dirty="0"/>
-              <a:t>mit Tasten 1,2,3.. wird vorerst beibehalten</a:t>
-            </a:r>
-          </a:p>
-          <a:p>
-            <a:pPr marL="0" indent="0">
-              <a:buNone/>
-            </a:pPr>
+              <a:t>Erhöhung des Schwierigkeitsgrades</a:t>
+            </a:r>
             <a:endParaRPr lang="de-DE" dirty="0"/>
           </a:p>
         </p:txBody>
@@ -6789,7 +6936,7 @@
     </p:spTree>
     <p:extLst>
       <p:ext uri="{BB962C8B-B14F-4D97-AF65-F5344CB8AC3E}">
-        <p14:creationId xmlns:p14="http://schemas.microsoft.com/office/powerpoint/2010/main" xmlns="" val="2149821311"/>
+        <p14:creationId xmlns:p14="http://schemas.microsoft.com/office/powerpoint/2010/main" val="2151821352"/>
       </p:ext>
     </p:extLst>
   </p:cSld>
@@ -6840,7 +6987,7 @@
           <a:p>
             <a:r>
               <a:rPr lang="de-DE" dirty="0" smtClean="0"/>
-              <a:t>Änderungen II</a:t>
+              <a:t>Probleme</a:t>
             </a:r>
             <a:endParaRPr lang="de-DE" dirty="0"/>
           </a:p>
@@ -6861,51 +7008,62 @@
           <a:bodyPr/>
           <a:lstStyle/>
           <a:p>
-            <a:pPr marL="0" indent="0">
-              <a:buNone/>
-            </a:pPr>
-            <a:r>
-              <a:rPr lang="de-DE" b="1" dirty="0" smtClean="0"/>
-              <a:t>Vorher: </a:t>
-            </a:r>
             <a:r>
               <a:rPr lang="de-DE" dirty="0" smtClean="0"/>
-              <a:t>Nur die benötigten Modi in einzelnen Räumen vorhanden (z.B. Keller: nur Taschenlampe)</a:t>
-            </a:r>
-          </a:p>
-          <a:p>
-            <a:pPr marL="0" indent="0">
-              <a:buNone/>
-            </a:pPr>
-            <a:r>
-              <a:rPr lang="de-DE" b="1" dirty="0" smtClean="0"/>
-              <a:t>Nachher: </a:t>
-            </a:r>
+              <a:t>Texturen aus Blender in </a:t>
+            </a:r>
+            <a:r>
+              <a:rPr lang="de-DE" dirty="0" err="1" smtClean="0"/>
+              <a:t>Unity</a:t>
+            </a:r>
+            <a:endParaRPr lang="de-DE" dirty="0" smtClean="0"/>
+          </a:p>
+          <a:p>
             <a:r>
               <a:rPr lang="de-DE" dirty="0" smtClean="0"/>
-              <a:t>Alle Modi </a:t>
-            </a:r>
-            <a:r>
-              <a:rPr lang="de-DE" dirty="0"/>
-              <a:t>ü</a:t>
-            </a:r>
+              <a:t>Probleme mit Blender</a:t>
+            </a:r>
+          </a:p>
+          <a:p>
             <a:r>
               <a:rPr lang="de-DE" dirty="0" smtClean="0"/>
-              <a:t>berall verwendbar, aber nicht immer benötigt (Keller: Taschenlampe, UV, Röntgen)</a:t>
-            </a:r>
-          </a:p>
-          <a:p>
-            <a:pPr marL="0" indent="0">
-              <a:buNone/>
-            </a:pPr>
-            <a:r>
-              <a:rPr lang="de-DE" b="1" dirty="0" smtClean="0"/>
-              <a:t>Grund: </a:t>
+              <a:t>Einbauen der Modi (Dank Martin gelöst </a:t>
+            </a:r>
+            <a:r>
+              <a:rPr lang="de-DE" dirty="0" smtClean="0">
+                <a:sym typeface="Wingdings" panose="05000000000000000000" pitchFamily="2" charset="2"/>
+              </a:rPr>
+              <a:t></a:t>
             </a:r>
             <a:r>
               <a:rPr lang="de-DE" dirty="0" smtClean="0"/>
-              <a:t>Erhöhung des Schwierigkeitsgrades</a:t>
-            </a:r>
+              <a:t>)</a:t>
+            </a:r>
+          </a:p>
+          <a:p>
+            <a:r>
+              <a:rPr lang="de-DE" dirty="0" smtClean="0"/>
+              <a:t>Denkfehler: Spotlight muss natürlich an selber Position wie Kamera sein um keinen Offset beim </a:t>
+            </a:r>
+            <a:r>
+              <a:rPr lang="de-DE" dirty="0" err="1" smtClean="0"/>
+              <a:t>eyetracking</a:t>
+            </a:r>
+            <a:r>
+              <a:rPr lang="de-DE" dirty="0" smtClean="0"/>
+              <a:t> zu erzeugen...</a:t>
+            </a:r>
+          </a:p>
+          <a:p>
+            <a:r>
+              <a:rPr lang="de-DE" dirty="0" smtClean="0"/>
+              <a:t>Zeitmanagement (Klausuren, andere Projekte…) </a:t>
+            </a:r>
+          </a:p>
+          <a:p>
+            <a:endParaRPr lang="de-DE" dirty="0" smtClean="0"/>
+          </a:p>
+          <a:p>
             <a:endParaRPr lang="de-DE" dirty="0"/>
           </a:p>
         </p:txBody>
@@ -6913,7 +7071,7 @@
     </p:spTree>
     <p:extLst>
       <p:ext uri="{BB962C8B-B14F-4D97-AF65-F5344CB8AC3E}">
-        <p14:creationId xmlns:p14="http://schemas.microsoft.com/office/powerpoint/2010/main" xmlns="" val="2151821352"/>
+        <p14:creationId xmlns:p14="http://schemas.microsoft.com/office/powerpoint/2010/main" val="2106991448"/>
       </p:ext>
     </p:extLst>
   </p:cSld>
@@ -6964,7 +7122,7 @@
           <a:p>
             <a:r>
               <a:rPr lang="de-DE" dirty="0" smtClean="0"/>
-              <a:t>Probleme</a:t>
+              <a:t>Was wir geplant hatten…</a:t>
             </a:r>
             <a:endParaRPr lang="de-DE" dirty="0"/>
           </a:p>
@@ -6987,58 +7145,22 @@
           <a:p>
             <a:r>
               <a:rPr lang="de-DE" dirty="0" smtClean="0"/>
-              <a:t>Texturen aus Blender in </a:t>
-            </a:r>
-            <a:r>
-              <a:rPr lang="de-DE" dirty="0" err="1" smtClean="0"/>
-              <a:t>Unity</a:t>
-            </a:r>
-            <a:endParaRPr lang="de-DE" dirty="0" smtClean="0"/>
-          </a:p>
-          <a:p>
+              <a:t>Inventar und Menü </a:t>
+            </a:r>
             <a:r>
               <a:rPr lang="de-DE" dirty="0" smtClean="0"/>
-              <a:t>Probleme mit Blender</a:t>
+              <a:t>einbauen: durch Zeitmangel leider nicht mehr möglich</a:t>
             </a:r>
           </a:p>
           <a:p>
             <a:r>
               <a:rPr lang="de-DE" dirty="0" smtClean="0"/>
-              <a:t>Einbauen der Modi (Dank Martin gelöst </a:t>
-            </a:r>
-            <a:r>
-              <a:rPr lang="de-DE" dirty="0" smtClean="0">
-                <a:sym typeface="Wingdings" panose="05000000000000000000" pitchFamily="2" charset="2"/>
-              </a:rPr>
-              <a:t></a:t>
+              <a:t>Fast </a:t>
             </a:r>
             <a:r>
               <a:rPr lang="de-DE" dirty="0" smtClean="0"/>
-              <a:t>)</a:t>
-            </a:r>
-          </a:p>
-          <a:p>
-            <a:r>
-              <a:rPr lang="de-DE" dirty="0" smtClean="0"/>
-              <a:t>Denkfehler: Spotlight muss natürlich an selber Position wie Kamera sein um keinen Offset beim </a:t>
-            </a:r>
-            <a:r>
-              <a:rPr lang="de-DE" dirty="0" err="1" smtClean="0"/>
-              <a:t>eyetracking</a:t>
-            </a:r>
-            <a:r>
-              <a:rPr lang="de-DE" dirty="0" smtClean="0"/>
-              <a:t> zu erzeugen...</a:t>
-            </a:r>
-          </a:p>
-          <a:p>
-            <a:r>
-              <a:rPr lang="de-DE" dirty="0" smtClean="0"/>
-              <a:t>Zeitmanagement (Klausuren, andere Projekte…) </a:t>
-            </a:r>
-          </a:p>
-          <a:p>
-            <a:endParaRPr lang="de-DE" dirty="0" smtClean="0"/>
+              <a:t>alle Räume einbauen: Jeder hat sich jetzt nur auf einen Raum konzentriert</a:t>
+            </a:r>
           </a:p>
           <a:p>
             <a:endParaRPr lang="de-DE" dirty="0"/>
@@ -7048,7 +7170,7 @@
     </p:spTree>
     <p:extLst>
       <p:ext uri="{BB962C8B-B14F-4D97-AF65-F5344CB8AC3E}">
-        <p14:creationId xmlns:p14="http://schemas.microsoft.com/office/powerpoint/2010/main" xmlns="" val="2106991448"/>
+        <p14:creationId xmlns:p14="http://schemas.microsoft.com/office/powerpoint/2010/main" val="1372986178"/>
       </p:ext>
     </p:extLst>
   </p:cSld>
@@ -7097,10 +7219,6 @@
           <a:bodyPr/>
           <a:lstStyle/>
           <a:p>
-            <a:r>
-              <a:rPr lang="de-DE" dirty="0" smtClean="0"/>
-              <a:t>Was wir geplant hatten…</a:t>
-            </a:r>
             <a:endParaRPr lang="de-DE" dirty="0"/>
           </a:p>
         </p:txBody>
@@ -7117,35 +7235,45 @@
         </p:nvSpPr>
         <p:spPr/>
         <p:txBody>
-          <a:bodyPr/>
-          <a:lstStyle/>
-          <a:p>
-            <a:r>
-              <a:rPr lang="de-DE" dirty="0" smtClean="0"/>
-              <a:t>Inventar einbauen: durch Zeitmangel leider nicht mehr möglich</a:t>
-            </a:r>
-          </a:p>
-          <a:p>
-            <a:r>
-              <a:rPr lang="de-DE" dirty="0" smtClean="0"/>
-              <a:t>(Screenshot)</a:t>
-            </a:r>
-          </a:p>
-          <a:p>
-            <a:r>
-              <a:rPr lang="de-DE" dirty="0" smtClean="0"/>
-              <a:t>Fast alle Räume einbauen: Jeder hat sich jetzt nur auf einen Raum konzentriert</a:t>
-            </a:r>
-          </a:p>
-          <a:p>
-            <a:endParaRPr lang="de-DE" dirty="0"/>
-          </a:p>
-        </p:txBody>
-      </p:sp>
+          <a:bodyPr>
+            <a:normAutofit/>
+          </a:bodyPr>
+          <a:lstStyle/>
+          <a:p>
+            <a:endParaRPr lang="de-DE" dirty="0" smtClean="0"/>
+          </a:p>
+        </p:txBody>
+      </p:sp>
+      <p:pic>
+        <p:nvPicPr>
+          <p:cNvPr id="2050" name="Picture 2" descr="C:\Users\movement\Documents\MenübildKiZi.png"/>
+          <p:cNvPicPr>
+            <a:picLocks noChangeAspect="1" noChangeArrowheads="1"/>
+          </p:cNvPicPr>
+          <p:nvPr/>
+        </p:nvPicPr>
+        <p:blipFill>
+          <a:blip r:embed="rId2"/>
+          <a:srcRect/>
+          <a:stretch>
+            <a:fillRect/>
+          </a:stretch>
+        </p:blipFill>
+        <p:spPr bwMode="auto">
+          <a:xfrm>
+            <a:off x="0" y="-1"/>
+            <a:ext cx="12192000" cy="6873679"/>
+          </a:xfrm>
+          <a:prstGeom prst="rect">
+            <a:avLst/>
+          </a:prstGeom>
+          <a:noFill/>
+        </p:spPr>
+      </p:pic>
     </p:spTree>
     <p:extLst>
       <p:ext uri="{BB962C8B-B14F-4D97-AF65-F5344CB8AC3E}">
-        <p14:creationId xmlns:p14="http://schemas.microsoft.com/office/powerpoint/2010/main" xmlns="" val="1372986178"/>
+        <p14:creationId xmlns:p14="http://schemas.microsoft.com/office/powerpoint/2010/main" val="205027957"/>
       </p:ext>
     </p:extLst>
   </p:cSld>
@@ -7179,94 +7307,45 @@
           <a:chExt cx="0" cy="0"/>
         </a:xfrm>
       </p:grpSpPr>
-      <p:sp>
-        <p:nvSpPr>
-          <p:cNvPr id="2" name="Titel 1"/>
-          <p:cNvSpPr>
-            <a:spLocks noGrp="1"/>
-          </p:cNvSpPr>
-          <p:nvPr>
-            <p:ph type="title"/>
-          </p:nvPr>
-        </p:nvSpPr>
-        <p:spPr/>
-        <p:txBody>
-          <a:bodyPr/>
-          <a:lstStyle/>
-          <a:p>
-            <a:r>
-              <a:rPr lang="de-DE" dirty="0" smtClean="0"/>
-              <a:t>Nächste Schritte</a:t>
-            </a:r>
-            <a:endParaRPr lang="de-DE" dirty="0"/>
-          </a:p>
-        </p:txBody>
-      </p:sp>
-      <p:sp>
-        <p:nvSpPr>
-          <p:cNvPr id="3" name="Inhaltsplatzhalter 2"/>
-          <p:cNvSpPr>
-            <a:spLocks noGrp="1"/>
-          </p:cNvSpPr>
+      <p:pic>
+        <p:nvPicPr>
+          <p:cNvPr id="4" name="Inhaltsplatzhalter 3"/>
+          <p:cNvPicPr>
+            <a:picLocks noGrp="1" noChangeAspect="1"/>
+          </p:cNvPicPr>
           <p:nvPr>
             <p:ph idx="1"/>
           </p:nvPr>
-        </p:nvSpPr>
-        <p:spPr/>
-        <p:txBody>
-          <a:bodyPr/>
-          <a:lstStyle/>
-          <a:p>
-            <a:r>
-              <a:rPr lang="de-DE" dirty="0" smtClean="0"/>
-              <a:t>Materialien ausarbeiten für UV und Röntgen</a:t>
-            </a:r>
-          </a:p>
-          <a:p>
-            <a:r>
-              <a:rPr lang="de-DE" dirty="0" smtClean="0"/>
-              <a:t>Menü/Inventar einbauen</a:t>
-            </a:r>
-          </a:p>
-          <a:p>
-            <a:r>
-              <a:rPr lang="de-DE" dirty="0"/>
-              <a:t>Rätsel </a:t>
-            </a:r>
-            <a:r>
-              <a:rPr lang="de-DE" dirty="0" smtClean="0"/>
-              <a:t>fertigstellen</a:t>
-            </a:r>
-          </a:p>
-          <a:p>
-            <a:r>
-              <a:rPr lang="de-DE" smtClean="0"/>
-              <a:t>Insgesamt: FERTIG MACHEN</a:t>
-            </a:r>
-            <a:endParaRPr lang="de-DE" dirty="0"/>
-          </a:p>
-          <a:p>
-            <a:endParaRPr lang="de-DE" dirty="0" smtClean="0"/>
-          </a:p>
-        </p:txBody>
-      </p:sp>
+        </p:nvPicPr>
+        <p:blipFill>
+          <a:blip r:embed="rId2">
+            <a:extLst>
+              <a:ext uri="{28A0092B-C50C-407E-A947-70E740481C1C}">
+                <a14:useLocalDpi xmlns:a14="http://schemas.microsoft.com/office/drawing/2010/main" val="0"/>
+              </a:ext>
+            </a:extLst>
+          </a:blip>
+          <a:stretch>
+            <a:fillRect/>
+          </a:stretch>
+        </p:blipFill>
+        <p:spPr>
+          <a:xfrm>
+            <a:off x="1847684" y="748145"/>
+            <a:ext cx="8559077" cy="4772891"/>
+          </a:xfrm>
+        </p:spPr>
+      </p:pic>
     </p:spTree>
     <p:extLst>
       <p:ext uri="{BB962C8B-B14F-4D97-AF65-F5344CB8AC3E}">
-        <p14:creationId xmlns:p14="http://schemas.microsoft.com/office/powerpoint/2010/main" xmlns="" val="1854967349"/>
+        <p14:creationId xmlns:p14="http://schemas.microsoft.com/office/powerpoint/2010/main" val="3875503287"/>
       </p:ext>
     </p:extLst>
   </p:cSld>
   <p:clrMapOvr>
     <a:masterClrMapping/>
   </p:clrMapOvr>
-  <p:timing>
-    <p:tnLst>
-      <p:par>
-        <p:cTn id="1" dur="indefinite" restart="never" nodeType="tmRoot"/>
-      </p:par>
-    </p:tnLst>
-  </p:timing>
 </p:sld>
 </file>
 
@@ -7520,7 +7599,7 @@
   <a:extraClrSchemeLst/>
   <a:extLst>
     <a:ext uri="{05A4C25C-085E-4340-85A3-A5531E510DB2}">
-      <thm15:themeFamily xmlns:thm15="http://schemas.microsoft.com/office/thememl/2012/main" xmlns="" name="Parallax" id="{3388167B-A2EB-4685-9635-1831D9AEF8C4}" vid="{4F7A876A-7598-49CA-AFC8-8EDA2551E4A7}"/>
+      <thm15:themeFamily xmlns:thm15="http://schemas.microsoft.com/office/thememl/2012/main" name="Parallax" id="{3388167B-A2EB-4685-9635-1831D9AEF8C4}" vid="{4F7A876A-7598-49CA-AFC8-8EDA2551E4A7}"/>
     </a:ext>
   </a:extLst>
 </a:theme>

</xml_diff>